<commit_message>
Routes refactoring to prepare client application
</commit_message>
<xml_diff>
--- a/public/ressources/TechnologicalPlan.pptx
+++ b/public/ressources/TechnologicalPlan.pptx
@@ -243,7 +243,7 @@
           <a:p>
             <a:fld id="{4AC2AF7A-E11C-429C-9E65-E4BA6D2FC408}" type="datetimeFigureOut">
               <a:rPr lang="fr-FR" smtClean="0"/>
-              <a:t>19/04/2017</a:t>
+              <a:t>27/04/2017</a:t>
             </a:fld>
             <a:endParaRPr lang="fr-FR"/>
           </a:p>
@@ -413,7 +413,7 @@
           <a:p>
             <a:fld id="{4AC2AF7A-E11C-429C-9E65-E4BA6D2FC408}" type="datetimeFigureOut">
               <a:rPr lang="fr-FR" smtClean="0"/>
-              <a:t>19/04/2017</a:t>
+              <a:t>27/04/2017</a:t>
             </a:fld>
             <a:endParaRPr lang="fr-FR"/>
           </a:p>
@@ -593,7 +593,7 @@
           <a:p>
             <a:fld id="{4AC2AF7A-E11C-429C-9E65-E4BA6D2FC408}" type="datetimeFigureOut">
               <a:rPr lang="fr-FR" smtClean="0"/>
-              <a:t>19/04/2017</a:t>
+              <a:t>27/04/2017</a:t>
             </a:fld>
             <a:endParaRPr lang="fr-FR"/>
           </a:p>
@@ -763,7 +763,7 @@
           <a:p>
             <a:fld id="{4AC2AF7A-E11C-429C-9E65-E4BA6D2FC408}" type="datetimeFigureOut">
               <a:rPr lang="fr-FR" smtClean="0"/>
-              <a:t>19/04/2017</a:t>
+              <a:t>27/04/2017</a:t>
             </a:fld>
             <a:endParaRPr lang="fr-FR"/>
           </a:p>
@@ -1009,7 +1009,7 @@
           <a:p>
             <a:fld id="{4AC2AF7A-E11C-429C-9E65-E4BA6D2FC408}" type="datetimeFigureOut">
               <a:rPr lang="fr-FR" smtClean="0"/>
-              <a:t>19/04/2017</a:t>
+              <a:t>27/04/2017</a:t>
             </a:fld>
             <a:endParaRPr lang="fr-FR"/>
           </a:p>
@@ -1241,7 +1241,7 @@
           <a:p>
             <a:fld id="{4AC2AF7A-E11C-429C-9E65-E4BA6D2FC408}" type="datetimeFigureOut">
               <a:rPr lang="fr-FR" smtClean="0"/>
-              <a:t>19/04/2017</a:t>
+              <a:t>27/04/2017</a:t>
             </a:fld>
             <a:endParaRPr lang="fr-FR"/>
           </a:p>
@@ -1608,7 +1608,7 @@
           <a:p>
             <a:fld id="{4AC2AF7A-E11C-429C-9E65-E4BA6D2FC408}" type="datetimeFigureOut">
               <a:rPr lang="fr-FR" smtClean="0"/>
-              <a:t>19/04/2017</a:t>
+              <a:t>27/04/2017</a:t>
             </a:fld>
             <a:endParaRPr lang="fr-FR"/>
           </a:p>
@@ -1726,7 +1726,7 @@
           <a:p>
             <a:fld id="{4AC2AF7A-E11C-429C-9E65-E4BA6D2FC408}" type="datetimeFigureOut">
               <a:rPr lang="fr-FR" smtClean="0"/>
-              <a:t>19/04/2017</a:t>
+              <a:t>27/04/2017</a:t>
             </a:fld>
             <a:endParaRPr lang="fr-FR"/>
           </a:p>
@@ -1821,7 +1821,7 @@
           <a:p>
             <a:fld id="{4AC2AF7A-E11C-429C-9E65-E4BA6D2FC408}" type="datetimeFigureOut">
               <a:rPr lang="fr-FR" smtClean="0"/>
-              <a:t>19/04/2017</a:t>
+              <a:t>27/04/2017</a:t>
             </a:fld>
             <a:endParaRPr lang="fr-FR"/>
           </a:p>
@@ -2098,7 +2098,7 @@
           <a:p>
             <a:fld id="{4AC2AF7A-E11C-429C-9E65-E4BA6D2FC408}" type="datetimeFigureOut">
               <a:rPr lang="fr-FR" smtClean="0"/>
-              <a:t>19/04/2017</a:t>
+              <a:t>27/04/2017</a:t>
             </a:fld>
             <a:endParaRPr lang="fr-FR"/>
           </a:p>
@@ -2351,7 +2351,7 @@
           <a:p>
             <a:fld id="{4AC2AF7A-E11C-429C-9E65-E4BA6D2FC408}" type="datetimeFigureOut">
               <a:rPr lang="fr-FR" smtClean="0"/>
-              <a:t>19/04/2017</a:t>
+              <a:t>27/04/2017</a:t>
             </a:fld>
             <a:endParaRPr lang="fr-FR"/>
           </a:p>
@@ -2564,7 +2564,7 @@
           <a:p>
             <a:fld id="{4AC2AF7A-E11C-429C-9E65-E4BA6D2FC408}" type="datetimeFigureOut">
               <a:rPr lang="fr-FR" smtClean="0"/>
-              <a:t>19/04/2017</a:t>
+              <a:t>27/04/2017</a:t>
             </a:fld>
             <a:endParaRPr lang="fr-FR"/>
           </a:p>

</xml_diff>

<commit_message>
Update front routing to prepare a second client front
</commit_message>
<xml_diff>
--- a/public/ressources/TechnologicalPlan.pptx
+++ b/public/ressources/TechnologicalPlan.pptx
@@ -6,6 +6,7 @@
   </p:sldMasterIdLst>
   <p:sldIdLst>
     <p:sldId id="256" r:id="rId2"/>
+    <p:sldId id="257" r:id="rId3"/>
   </p:sldIdLst>
   <p:sldSz cx="12192000" cy="6858000"/>
   <p:notesSz cx="6858000" cy="9144000"/>
@@ -243,7 +244,7 @@
           <a:p>
             <a:fld id="{4AC2AF7A-E11C-429C-9E65-E4BA6D2FC408}" type="datetimeFigureOut">
               <a:rPr lang="fr-FR" smtClean="0"/>
-              <a:t>27/04/2017</a:t>
+              <a:t>03/05/2017</a:t>
             </a:fld>
             <a:endParaRPr lang="fr-FR"/>
           </a:p>
@@ -413,7 +414,7 @@
           <a:p>
             <a:fld id="{4AC2AF7A-E11C-429C-9E65-E4BA6D2FC408}" type="datetimeFigureOut">
               <a:rPr lang="fr-FR" smtClean="0"/>
-              <a:t>27/04/2017</a:t>
+              <a:t>03/05/2017</a:t>
             </a:fld>
             <a:endParaRPr lang="fr-FR"/>
           </a:p>
@@ -593,7 +594,7 @@
           <a:p>
             <a:fld id="{4AC2AF7A-E11C-429C-9E65-E4BA6D2FC408}" type="datetimeFigureOut">
               <a:rPr lang="fr-FR" smtClean="0"/>
-              <a:t>27/04/2017</a:t>
+              <a:t>03/05/2017</a:t>
             </a:fld>
             <a:endParaRPr lang="fr-FR"/>
           </a:p>
@@ -763,7 +764,7 @@
           <a:p>
             <a:fld id="{4AC2AF7A-E11C-429C-9E65-E4BA6D2FC408}" type="datetimeFigureOut">
               <a:rPr lang="fr-FR" smtClean="0"/>
-              <a:t>27/04/2017</a:t>
+              <a:t>03/05/2017</a:t>
             </a:fld>
             <a:endParaRPr lang="fr-FR"/>
           </a:p>
@@ -1009,7 +1010,7 @@
           <a:p>
             <a:fld id="{4AC2AF7A-E11C-429C-9E65-E4BA6D2FC408}" type="datetimeFigureOut">
               <a:rPr lang="fr-FR" smtClean="0"/>
-              <a:t>27/04/2017</a:t>
+              <a:t>03/05/2017</a:t>
             </a:fld>
             <a:endParaRPr lang="fr-FR"/>
           </a:p>
@@ -1241,7 +1242,7 @@
           <a:p>
             <a:fld id="{4AC2AF7A-E11C-429C-9E65-E4BA6D2FC408}" type="datetimeFigureOut">
               <a:rPr lang="fr-FR" smtClean="0"/>
-              <a:t>27/04/2017</a:t>
+              <a:t>03/05/2017</a:t>
             </a:fld>
             <a:endParaRPr lang="fr-FR"/>
           </a:p>
@@ -1608,7 +1609,7 @@
           <a:p>
             <a:fld id="{4AC2AF7A-E11C-429C-9E65-E4BA6D2FC408}" type="datetimeFigureOut">
               <a:rPr lang="fr-FR" smtClean="0"/>
-              <a:t>27/04/2017</a:t>
+              <a:t>03/05/2017</a:t>
             </a:fld>
             <a:endParaRPr lang="fr-FR"/>
           </a:p>
@@ -1726,7 +1727,7 @@
           <a:p>
             <a:fld id="{4AC2AF7A-E11C-429C-9E65-E4BA6D2FC408}" type="datetimeFigureOut">
               <a:rPr lang="fr-FR" smtClean="0"/>
-              <a:t>27/04/2017</a:t>
+              <a:t>03/05/2017</a:t>
             </a:fld>
             <a:endParaRPr lang="fr-FR"/>
           </a:p>
@@ -1821,7 +1822,7 @@
           <a:p>
             <a:fld id="{4AC2AF7A-E11C-429C-9E65-E4BA6D2FC408}" type="datetimeFigureOut">
               <a:rPr lang="fr-FR" smtClean="0"/>
-              <a:t>27/04/2017</a:t>
+              <a:t>03/05/2017</a:t>
             </a:fld>
             <a:endParaRPr lang="fr-FR"/>
           </a:p>
@@ -2098,7 +2099,7 @@
           <a:p>
             <a:fld id="{4AC2AF7A-E11C-429C-9E65-E4BA6D2FC408}" type="datetimeFigureOut">
               <a:rPr lang="fr-FR" smtClean="0"/>
-              <a:t>27/04/2017</a:t>
+              <a:t>03/05/2017</a:t>
             </a:fld>
             <a:endParaRPr lang="fr-FR"/>
           </a:p>
@@ -2351,7 +2352,7 @@
           <a:p>
             <a:fld id="{4AC2AF7A-E11C-429C-9E65-E4BA6D2FC408}" type="datetimeFigureOut">
               <a:rPr lang="fr-FR" smtClean="0"/>
-              <a:t>27/04/2017</a:t>
+              <a:t>03/05/2017</a:t>
             </a:fld>
             <a:endParaRPr lang="fr-FR"/>
           </a:p>
@@ -2564,7 +2565,7 @@
           <a:p>
             <a:fld id="{4AC2AF7A-E11C-429C-9E65-E4BA6D2FC408}" type="datetimeFigureOut">
               <a:rPr lang="fr-FR" smtClean="0"/>
-              <a:t>27/04/2017</a:t>
+              <a:t>03/05/2017</a:t>
             </a:fld>
             <a:endParaRPr lang="fr-FR"/>
           </a:p>
@@ -3063,18 +3064,27 @@
       </p:sp>
       <p:sp>
         <p:nvSpPr>
-          <p:cNvPr id="7" name="Organigramme : Disque magnétique 6"/>
+          <p:cNvPr id="35" name="Rectangle 34"/>
           <p:cNvSpPr/>
           <p:nvPr/>
         </p:nvSpPr>
         <p:spPr>
-          <a:xfrm>
-            <a:off x="548331" y="4536694"/>
-            <a:ext cx="959710" cy="1029020"/>
-          </a:xfrm>
-          <a:prstGeom prst="flowChartMagneticDisk">
+          <a:xfrm rot="16200000">
+            <a:off x="6737437" y="3529998"/>
+            <a:ext cx="3852407" cy="192955"/>
+          </a:xfrm>
+          <a:prstGeom prst="rect">
             <a:avLst/>
           </a:prstGeom>
+          <a:solidFill>
+            <a:schemeClr val="accent2">
+              <a:lumMod val="60000"/>
+              <a:lumOff val="40000"/>
+            </a:schemeClr>
+          </a:solidFill>
+          <a:ln>
+            <a:noFill/>
+          </a:ln>
         </p:spPr>
         <p:style>
           <a:lnRef idx="2">
@@ -3097,24 +3107,20 @@
           <a:lstStyle/>
           <a:p>
             <a:pPr algn="ctr"/>
-            <a:r>
-              <a:rPr lang="fr-FR" sz="1600" dirty="0" err="1" smtClean="0"/>
-              <a:t>IndexedDB</a:t>
-            </a:r>
-            <a:endParaRPr lang="fr-FR" sz="1600" dirty="0"/>
-          </a:p>
-        </p:txBody>
-      </p:sp>
-      <p:sp>
-        <p:nvSpPr>
-          <p:cNvPr id="8" name="Organigramme : Disque magnétique 7"/>
+            <a:endParaRPr lang="fr-FR" dirty="0"/>
+          </a:p>
+        </p:txBody>
+      </p:sp>
+      <p:sp>
+        <p:nvSpPr>
+          <p:cNvPr id="7" name="Organigramme : Disque magnétique 6"/>
           <p:cNvSpPr/>
           <p:nvPr/>
         </p:nvSpPr>
         <p:spPr>
           <a:xfrm>
-            <a:off x="10810697" y="2569451"/>
-            <a:ext cx="985887" cy="1266567"/>
+            <a:off x="548331" y="4536694"/>
+            <a:ext cx="959710" cy="1029020"/>
           </a:xfrm>
           <a:prstGeom prst="flowChartMagneticDisk">
             <a:avLst/>
@@ -3142,6 +3148,50 @@
           <a:p>
             <a:pPr algn="ctr"/>
             <a:r>
+              <a:rPr lang="fr-FR" sz="1600" dirty="0" err="1" smtClean="0"/>
+              <a:t>IndexedDB</a:t>
+            </a:r>
+            <a:endParaRPr lang="fr-FR" sz="1600" dirty="0"/>
+          </a:p>
+        </p:txBody>
+      </p:sp>
+      <p:sp>
+        <p:nvSpPr>
+          <p:cNvPr id="8" name="Organigramme : Disque magnétique 7"/>
+          <p:cNvSpPr/>
+          <p:nvPr/>
+        </p:nvSpPr>
+        <p:spPr>
+          <a:xfrm>
+            <a:off x="10810697" y="2569451"/>
+            <a:ext cx="985887" cy="1266567"/>
+          </a:xfrm>
+          <a:prstGeom prst="flowChartMagneticDisk">
+            <a:avLst/>
+          </a:prstGeom>
+        </p:spPr>
+        <p:style>
+          <a:lnRef idx="2">
+            <a:schemeClr val="accent1">
+              <a:shade val="50000"/>
+            </a:schemeClr>
+          </a:lnRef>
+          <a:fillRef idx="1">
+            <a:schemeClr val="accent1"/>
+          </a:fillRef>
+          <a:effectRef idx="0">
+            <a:schemeClr val="accent1"/>
+          </a:effectRef>
+          <a:fontRef idx="minor">
+            <a:schemeClr val="lt1"/>
+          </a:fontRef>
+        </p:style>
+        <p:txBody>
+          <a:bodyPr rtlCol="0" anchor="ctr"/>
+          <a:lstStyle/>
+          <a:p>
+            <a:pPr algn="ctr"/>
+            <a:r>
               <a:rPr lang="fr-FR" sz="1600" dirty="0" smtClean="0"/>
               <a:t>Server</a:t>
             </a:r>
@@ -3207,7 +3257,19 @@
             </a:r>
             <a:r>
               <a:rPr lang="en-US" sz="2000" dirty="0" smtClean="0"/>
-              <a:t>pplication Technological Plan</a:t>
+              <a:t>pplication Technological </a:t>
+            </a:r>
+            <a:r>
+              <a:rPr lang="en-US" sz="2000" dirty="0" smtClean="0"/>
+              <a:t>Plan (With </a:t>
+            </a:r>
+            <a:r>
+              <a:rPr lang="en-US" sz="2000" dirty="0" err="1" smtClean="0"/>
+              <a:t>IndexedDB</a:t>
+            </a:r>
+            <a:r>
+              <a:rPr lang="en-US" sz="2000" dirty="0" smtClean="0"/>
+              <a:t> and Vue.JS)</a:t>
             </a:r>
             <a:endParaRPr lang="fr-FR" sz="2000" dirty="0"/>
           </a:p>
@@ -3464,49 +3526,6 @@
       </p:sp>
       <p:sp>
         <p:nvSpPr>
-          <p:cNvPr id="18" name="ZoneTexte 17"/>
-          <p:cNvSpPr txBox="1"/>
-          <p:nvPr/>
-        </p:nvSpPr>
-        <p:spPr>
-          <a:xfrm>
-            <a:off x="7949928" y="5225505"/>
-            <a:ext cx="1175952" cy="369332"/>
-          </a:xfrm>
-          <a:prstGeom prst="rect">
-            <a:avLst/>
-          </a:prstGeom>
-          <a:solidFill>
-            <a:schemeClr val="accent5">
-              <a:lumMod val="75000"/>
-            </a:schemeClr>
-          </a:solidFill>
-        </p:spPr>
-        <p:txBody>
-          <a:bodyPr wrap="square" rtlCol="0">
-            <a:spAutoFit/>
-          </a:bodyPr>
-          <a:lstStyle/>
-          <a:p>
-            <a:pPr algn="ctr"/>
-            <a:r>
-              <a:rPr lang="fr-FR" dirty="0" smtClean="0">
-                <a:solidFill>
-                  <a:schemeClr val="bg1"/>
-                </a:solidFill>
-              </a:rPr>
-              <a:t>Vue.JS</a:t>
-            </a:r>
-            <a:endParaRPr lang="fr-FR" dirty="0">
-              <a:solidFill>
-                <a:schemeClr val="bg1"/>
-              </a:solidFill>
-            </a:endParaRPr>
-          </a:p>
-        </p:txBody>
-      </p:sp>
-      <p:sp>
-        <p:nvSpPr>
           <p:cNvPr id="20" name="ZoneTexte 19"/>
           <p:cNvSpPr txBox="1"/>
           <p:nvPr/>
@@ -3661,55 +3680,6 @@
           <a:xfrm rot="16200000">
             <a:off x="3165438" y="4279061"/>
             <a:ext cx="2172154" cy="324899"/>
-          </a:xfrm>
-          <a:prstGeom prst="rightArrow">
-            <a:avLst/>
-          </a:prstGeom>
-          <a:solidFill>
-            <a:schemeClr val="accent2">
-              <a:lumMod val="60000"/>
-              <a:lumOff val="40000"/>
-            </a:schemeClr>
-          </a:solidFill>
-          <a:ln>
-            <a:noFill/>
-          </a:ln>
-        </p:spPr>
-        <p:style>
-          <a:lnRef idx="2">
-            <a:schemeClr val="accent1">
-              <a:shade val="50000"/>
-            </a:schemeClr>
-          </a:lnRef>
-          <a:fillRef idx="1">
-            <a:schemeClr val="accent1"/>
-          </a:fillRef>
-          <a:effectRef idx="0">
-            <a:schemeClr val="accent1"/>
-          </a:effectRef>
-          <a:fontRef idx="minor">
-            <a:schemeClr val="lt1"/>
-          </a:fontRef>
-        </p:style>
-        <p:txBody>
-          <a:bodyPr rtlCol="0" anchor="ctr"/>
-          <a:lstStyle/>
-          <a:p>
-            <a:pPr algn="ctr"/>
-            <a:endParaRPr lang="fr-FR"/>
-          </a:p>
-        </p:txBody>
-      </p:sp>
-      <p:sp>
-        <p:nvSpPr>
-          <p:cNvPr id="28" name="Flèche droite 27"/>
-          <p:cNvSpPr/>
-          <p:nvPr/>
-        </p:nvSpPr>
-        <p:spPr>
-          <a:xfrm rot="5400000">
-            <a:off x="7747151" y="4109875"/>
-            <a:ext cx="1697241" cy="297933"/>
           </a:xfrm>
           <a:prstGeom prst="rightArrow">
             <a:avLst/>
@@ -4427,8 +4397,8 @@
         </p:nvSpPr>
         <p:spPr>
           <a:xfrm>
-            <a:off x="4176584" y="5354425"/>
-            <a:ext cx="3765105" cy="171631"/>
+            <a:off x="4827046" y="5359724"/>
+            <a:ext cx="3852407" cy="192955"/>
           </a:xfrm>
           <a:prstGeom prst="rect">
             <a:avLst/>
@@ -4464,7 +4434,11 @@
           <a:lstStyle/>
           <a:p>
             <a:pPr algn="ctr"/>
-            <a:endParaRPr lang="fr-FR"/>
+            <a:r>
+              <a:rPr lang="fr-FR" dirty="0" smtClean="0"/>
+              <a:t>v</a:t>
+            </a:r>
+            <a:endParaRPr lang="fr-FR" dirty="0"/>
           </a:p>
         </p:txBody>
       </p:sp>
@@ -4529,10 +4503,1261 @@
           </a:p>
         </p:txBody>
       </p:sp>
+      <p:sp>
+        <p:nvSpPr>
+          <p:cNvPr id="18" name="ZoneTexte 17"/>
+          <p:cNvSpPr txBox="1"/>
+          <p:nvPr/>
+        </p:nvSpPr>
+        <p:spPr>
+          <a:xfrm>
+            <a:off x="3659332" y="5245810"/>
+            <a:ext cx="1175952" cy="369332"/>
+          </a:xfrm>
+          <a:prstGeom prst="rect">
+            <a:avLst/>
+          </a:prstGeom>
+          <a:solidFill>
+            <a:schemeClr val="accent5">
+              <a:lumMod val="75000"/>
+            </a:schemeClr>
+          </a:solidFill>
+        </p:spPr>
+        <p:txBody>
+          <a:bodyPr wrap="square" rtlCol="0">
+            <a:spAutoFit/>
+          </a:bodyPr>
+          <a:lstStyle/>
+          <a:p>
+            <a:pPr algn="ctr"/>
+            <a:r>
+              <a:rPr lang="fr-FR" dirty="0" smtClean="0">
+                <a:solidFill>
+                  <a:schemeClr val="bg1"/>
+                </a:solidFill>
+              </a:rPr>
+              <a:t>Vue.JS</a:t>
+            </a:r>
+            <a:endParaRPr lang="fr-FR" dirty="0">
+              <a:solidFill>
+                <a:schemeClr val="bg1"/>
+              </a:solidFill>
+            </a:endParaRPr>
+          </a:p>
+        </p:txBody>
+      </p:sp>
     </p:spTree>
     <p:extLst>
       <p:ext uri="{BB962C8B-B14F-4D97-AF65-F5344CB8AC3E}">
         <p14:creationId xmlns:p14="http://schemas.microsoft.com/office/powerpoint/2010/main" val="817000323"/>
+      </p:ext>
+    </p:extLst>
+  </p:cSld>
+  <p:clrMapOvr>
+    <a:masterClrMapping/>
+  </p:clrMapOvr>
+  <p:timing>
+    <p:tnLst>
+      <p:par>
+        <p:cTn id="1" dur="indefinite" restart="never" nodeType="tmRoot"/>
+      </p:par>
+    </p:tnLst>
+  </p:timing>
+</p:sld>
+</file>
+
+<file path=ppt/slides/slide2.xml><?xml version="1.0" encoding="utf-8"?>
+<p:sld xmlns:a="http://schemas.openxmlformats.org/drawingml/2006/main" xmlns:r="http://schemas.openxmlformats.org/officeDocument/2006/relationships" xmlns:p="http://schemas.openxmlformats.org/presentationml/2006/main">
+  <p:cSld>
+    <p:spTree>
+      <p:nvGrpSpPr>
+        <p:cNvPr id="1" name=""/>
+        <p:cNvGrpSpPr/>
+        <p:nvPr/>
+      </p:nvGrpSpPr>
+      <p:grpSpPr>
+        <a:xfrm>
+          <a:off x="0" y="0"/>
+          <a:ext cx="0" cy="0"/>
+          <a:chOff x="0" y="0"/>
+          <a:chExt cx="0" cy="0"/>
+        </a:xfrm>
+      </p:grpSpPr>
+      <p:sp>
+        <p:nvSpPr>
+          <p:cNvPr id="4" name="Rectangle 3"/>
+          <p:cNvSpPr/>
+          <p:nvPr/>
+        </p:nvSpPr>
+        <p:spPr>
+          <a:xfrm>
+            <a:off x="1173824" y="1182404"/>
+            <a:ext cx="2396958" cy="4709984"/>
+          </a:xfrm>
+          <a:prstGeom prst="rect">
+            <a:avLst/>
+          </a:prstGeom>
+          <a:solidFill>
+            <a:schemeClr val="accent5">
+              <a:lumMod val="60000"/>
+              <a:lumOff val="40000"/>
+            </a:schemeClr>
+          </a:solidFill>
+        </p:spPr>
+        <p:style>
+          <a:lnRef idx="2">
+            <a:schemeClr val="accent1">
+              <a:shade val="50000"/>
+            </a:schemeClr>
+          </a:lnRef>
+          <a:fillRef idx="1">
+            <a:schemeClr val="accent1"/>
+          </a:fillRef>
+          <a:effectRef idx="0">
+            <a:schemeClr val="accent1"/>
+          </a:effectRef>
+          <a:fontRef idx="minor">
+            <a:schemeClr val="lt1"/>
+          </a:fontRef>
+        </p:style>
+        <p:txBody>
+          <a:bodyPr rtlCol="0" anchor="ctr"/>
+          <a:lstStyle/>
+          <a:p>
+            <a:pPr algn="ctr"/>
+            <a:endParaRPr lang="fr-FR"/>
+          </a:p>
+        </p:txBody>
+      </p:sp>
+      <p:sp>
+        <p:nvSpPr>
+          <p:cNvPr id="6" name="Rectangle 5"/>
+          <p:cNvSpPr/>
+          <p:nvPr/>
+        </p:nvSpPr>
+        <p:spPr>
+          <a:xfrm>
+            <a:off x="6240165" y="1178955"/>
+            <a:ext cx="4559640" cy="4709984"/>
+          </a:xfrm>
+          <a:prstGeom prst="rect">
+            <a:avLst/>
+          </a:prstGeom>
+          <a:solidFill>
+            <a:schemeClr val="accent6">
+              <a:lumMod val="20000"/>
+              <a:lumOff val="80000"/>
+            </a:schemeClr>
+          </a:solidFill>
+        </p:spPr>
+        <p:style>
+          <a:lnRef idx="2">
+            <a:schemeClr val="accent1">
+              <a:shade val="50000"/>
+            </a:schemeClr>
+          </a:lnRef>
+          <a:fillRef idx="1">
+            <a:schemeClr val="accent1"/>
+          </a:fillRef>
+          <a:effectRef idx="0">
+            <a:schemeClr val="accent1"/>
+          </a:effectRef>
+          <a:fontRef idx="minor">
+            <a:schemeClr val="lt1"/>
+          </a:fontRef>
+        </p:style>
+        <p:txBody>
+          <a:bodyPr rtlCol="0" anchor="ctr"/>
+          <a:lstStyle/>
+          <a:p>
+            <a:pPr algn="ctr"/>
+            <a:endParaRPr lang="fr-FR"/>
+          </a:p>
+        </p:txBody>
+      </p:sp>
+      <p:sp>
+        <p:nvSpPr>
+          <p:cNvPr id="35" name="Rectangle 34"/>
+          <p:cNvSpPr/>
+          <p:nvPr/>
+        </p:nvSpPr>
+        <p:spPr>
+          <a:xfrm rot="16200000">
+            <a:off x="5559426" y="3495931"/>
+            <a:ext cx="3852407" cy="192955"/>
+          </a:xfrm>
+          <a:prstGeom prst="rect">
+            <a:avLst/>
+          </a:prstGeom>
+          <a:solidFill>
+            <a:schemeClr val="accent2">
+              <a:lumMod val="60000"/>
+              <a:lumOff val="40000"/>
+            </a:schemeClr>
+          </a:solidFill>
+          <a:ln>
+            <a:noFill/>
+          </a:ln>
+        </p:spPr>
+        <p:style>
+          <a:lnRef idx="2">
+            <a:schemeClr val="accent1">
+              <a:shade val="50000"/>
+            </a:schemeClr>
+          </a:lnRef>
+          <a:fillRef idx="1">
+            <a:schemeClr val="accent1"/>
+          </a:fillRef>
+          <a:effectRef idx="0">
+            <a:schemeClr val="accent1"/>
+          </a:effectRef>
+          <a:fontRef idx="minor">
+            <a:schemeClr val="lt1"/>
+          </a:fontRef>
+        </p:style>
+        <p:txBody>
+          <a:bodyPr rtlCol="0" anchor="ctr"/>
+          <a:lstStyle/>
+          <a:p>
+            <a:pPr algn="ctr"/>
+            <a:endParaRPr lang="fr-FR" dirty="0"/>
+          </a:p>
+        </p:txBody>
+      </p:sp>
+      <p:sp>
+        <p:nvSpPr>
+          <p:cNvPr id="8" name="Organigramme : Disque magnétique 7"/>
+          <p:cNvSpPr/>
+          <p:nvPr/>
+        </p:nvSpPr>
+        <p:spPr>
+          <a:xfrm>
+            <a:off x="9632686" y="2560098"/>
+            <a:ext cx="985887" cy="1266567"/>
+          </a:xfrm>
+          <a:prstGeom prst="flowChartMagneticDisk">
+            <a:avLst/>
+          </a:prstGeom>
+        </p:spPr>
+        <p:style>
+          <a:lnRef idx="2">
+            <a:schemeClr val="accent1">
+              <a:shade val="50000"/>
+            </a:schemeClr>
+          </a:lnRef>
+          <a:fillRef idx="1">
+            <a:schemeClr val="accent1"/>
+          </a:fillRef>
+          <a:effectRef idx="0">
+            <a:schemeClr val="accent1"/>
+          </a:effectRef>
+          <a:fontRef idx="minor">
+            <a:schemeClr val="lt1"/>
+          </a:fontRef>
+        </p:style>
+        <p:txBody>
+          <a:bodyPr rtlCol="0" anchor="ctr"/>
+          <a:lstStyle/>
+          <a:p>
+            <a:pPr algn="ctr"/>
+            <a:r>
+              <a:rPr lang="fr-FR" sz="1600" dirty="0" smtClean="0"/>
+              <a:t>Server</a:t>
+            </a:r>
+            <a:endParaRPr lang="fr-FR" sz="1600" dirty="0"/>
+          </a:p>
+          <a:p>
+            <a:pPr algn="ctr"/>
+            <a:r>
+              <a:rPr lang="fr-FR" sz="1600" dirty="0" err="1" smtClean="0"/>
+              <a:t>Database</a:t>
+            </a:r>
+            <a:endParaRPr lang="fr-FR" sz="1600" dirty="0" smtClean="0"/>
+          </a:p>
+          <a:p>
+            <a:pPr algn="ctr"/>
+            <a:r>
+              <a:rPr lang="fr-FR" sz="1600" dirty="0" smtClean="0"/>
+              <a:t>(</a:t>
+            </a:r>
+            <a:r>
+              <a:rPr lang="fr-FR" sz="1600" dirty="0" err="1" smtClean="0"/>
+              <a:t>SQLite</a:t>
+            </a:r>
+            <a:r>
+              <a:rPr lang="fr-FR" sz="1600" dirty="0" smtClean="0"/>
+              <a:t>)</a:t>
+            </a:r>
+            <a:endParaRPr lang="fr-FR" sz="1600" dirty="0"/>
+          </a:p>
+        </p:txBody>
+      </p:sp>
+      <p:sp>
+        <p:nvSpPr>
+          <p:cNvPr id="9" name="ZoneTexte 8"/>
+          <p:cNvSpPr txBox="1"/>
+          <p:nvPr/>
+        </p:nvSpPr>
+        <p:spPr>
+          <a:xfrm>
+            <a:off x="0" y="123568"/>
+            <a:ext cx="12191999" cy="400110"/>
+          </a:xfrm>
+          <a:prstGeom prst="rect">
+            <a:avLst/>
+          </a:prstGeom>
+          <a:solidFill>
+            <a:schemeClr val="accent1">
+              <a:lumMod val="20000"/>
+              <a:lumOff val="80000"/>
+            </a:schemeClr>
+          </a:solidFill>
+        </p:spPr>
+        <p:txBody>
+          <a:bodyPr wrap="square" rtlCol="0">
+            <a:spAutoFit/>
+          </a:bodyPr>
+          <a:lstStyle/>
+          <a:p>
+            <a:pPr algn="ctr"/>
+            <a:r>
+              <a:rPr lang="en-US" sz="2000" dirty="0"/>
+              <a:t>A</a:t>
+            </a:r>
+            <a:r>
+              <a:rPr lang="en-US" sz="2000" dirty="0" smtClean="0"/>
+              <a:t>pplication Technological </a:t>
+            </a:r>
+            <a:r>
+              <a:rPr lang="en-US" sz="2000" dirty="0" smtClean="0"/>
+              <a:t>Plan (With Angular2)</a:t>
+            </a:r>
+            <a:endParaRPr lang="fr-FR" sz="2000" dirty="0"/>
+          </a:p>
+        </p:txBody>
+      </p:sp>
+      <p:sp>
+        <p:nvSpPr>
+          <p:cNvPr id="10" name="ZoneTexte 9"/>
+          <p:cNvSpPr txBox="1"/>
+          <p:nvPr/>
+        </p:nvSpPr>
+        <p:spPr>
+          <a:xfrm>
+            <a:off x="1173824" y="809623"/>
+            <a:ext cx="2396960" cy="369332"/>
+          </a:xfrm>
+          <a:prstGeom prst="rect">
+            <a:avLst/>
+          </a:prstGeom>
+          <a:solidFill>
+            <a:schemeClr val="accent5">
+              <a:lumMod val="40000"/>
+              <a:lumOff val="60000"/>
+            </a:schemeClr>
+          </a:solidFill>
+          <a:ln w="12700">
+            <a:solidFill>
+              <a:schemeClr val="tx2"/>
+            </a:solidFill>
+          </a:ln>
+        </p:spPr>
+        <p:txBody>
+          <a:bodyPr wrap="square" rtlCol="0">
+            <a:spAutoFit/>
+          </a:bodyPr>
+          <a:lstStyle/>
+          <a:p>
+            <a:pPr algn="ctr"/>
+            <a:r>
+              <a:rPr lang="fr-FR" dirty="0" smtClean="0"/>
+              <a:t>Client</a:t>
+            </a:r>
+          </a:p>
+        </p:txBody>
+      </p:sp>
+      <p:sp>
+        <p:nvSpPr>
+          <p:cNvPr id="13" name="Rectangle 12"/>
+          <p:cNvSpPr/>
+          <p:nvPr/>
+        </p:nvSpPr>
+        <p:spPr>
+          <a:xfrm>
+            <a:off x="1656961" y="2268430"/>
+            <a:ext cx="1482811" cy="790834"/>
+          </a:xfrm>
+          <a:prstGeom prst="rect">
+            <a:avLst/>
+          </a:prstGeom>
+        </p:spPr>
+        <p:style>
+          <a:lnRef idx="2">
+            <a:schemeClr val="accent1">
+              <a:shade val="50000"/>
+            </a:schemeClr>
+          </a:lnRef>
+          <a:fillRef idx="1">
+            <a:schemeClr val="accent1"/>
+          </a:fillRef>
+          <a:effectRef idx="0">
+            <a:schemeClr val="accent1"/>
+          </a:effectRef>
+          <a:fontRef idx="minor">
+            <a:schemeClr val="lt1"/>
+          </a:fontRef>
+        </p:style>
+        <p:txBody>
+          <a:bodyPr rtlCol="0" anchor="ctr"/>
+          <a:lstStyle/>
+          <a:p>
+            <a:pPr algn="ctr"/>
+            <a:r>
+              <a:rPr lang="fr-FR" dirty="0" smtClean="0"/>
+              <a:t>Client Page</a:t>
+            </a:r>
+          </a:p>
+          <a:p>
+            <a:pPr algn="ctr"/>
+            <a:r>
+              <a:rPr lang="fr-FR" sz="1200" dirty="0" smtClean="0"/>
+              <a:t>(</a:t>
+            </a:r>
+            <a:r>
+              <a:rPr lang="fr-FR" sz="1200" dirty="0" err="1" smtClean="0"/>
+              <a:t>Lists</a:t>
+            </a:r>
+            <a:r>
+              <a:rPr lang="fr-FR" sz="1200" dirty="0" smtClean="0"/>
+              <a:t>, </a:t>
+            </a:r>
+            <a:r>
+              <a:rPr lang="fr-FR" sz="1200" dirty="0" err="1" smtClean="0"/>
+              <a:t>Forms</a:t>
+            </a:r>
+            <a:r>
+              <a:rPr lang="fr-FR" sz="1200" dirty="0" smtClean="0"/>
+              <a:t>)</a:t>
+            </a:r>
+            <a:endParaRPr lang="fr-FR" dirty="0"/>
+          </a:p>
+        </p:txBody>
+      </p:sp>
+      <p:sp>
+        <p:nvSpPr>
+          <p:cNvPr id="16" name="ZoneTexte 15"/>
+          <p:cNvSpPr txBox="1"/>
+          <p:nvPr/>
+        </p:nvSpPr>
+        <p:spPr>
+          <a:xfrm>
+            <a:off x="6762952" y="2457918"/>
+            <a:ext cx="1493457" cy="369332"/>
+          </a:xfrm>
+          <a:prstGeom prst="rect">
+            <a:avLst/>
+          </a:prstGeom>
+          <a:solidFill>
+            <a:schemeClr val="accent5">
+              <a:lumMod val="75000"/>
+            </a:schemeClr>
+          </a:solidFill>
+          <a:ln>
+            <a:solidFill>
+              <a:schemeClr val="tx2"/>
+            </a:solidFill>
+          </a:ln>
+        </p:spPr>
+        <p:txBody>
+          <a:bodyPr wrap="square" rtlCol="0">
+            <a:spAutoFit/>
+          </a:bodyPr>
+          <a:lstStyle/>
+          <a:p>
+            <a:pPr algn="ctr"/>
+            <a:r>
+              <a:rPr lang="fr-FR" dirty="0" smtClean="0">
+                <a:solidFill>
+                  <a:schemeClr val="bg1"/>
+                </a:solidFill>
+              </a:rPr>
+              <a:t>Express</a:t>
+            </a:r>
+            <a:endParaRPr lang="fr-FR" dirty="0">
+              <a:solidFill>
+                <a:schemeClr val="bg1"/>
+              </a:solidFill>
+            </a:endParaRPr>
+          </a:p>
+        </p:txBody>
+      </p:sp>
+      <p:sp>
+        <p:nvSpPr>
+          <p:cNvPr id="17" name="ZoneTexte 16"/>
+          <p:cNvSpPr txBox="1"/>
+          <p:nvPr/>
+        </p:nvSpPr>
+        <p:spPr>
+          <a:xfrm>
+            <a:off x="6771916" y="2980897"/>
+            <a:ext cx="1484491" cy="369332"/>
+          </a:xfrm>
+          <a:prstGeom prst="rect">
+            <a:avLst/>
+          </a:prstGeom>
+          <a:solidFill>
+            <a:schemeClr val="accent5">
+              <a:lumMod val="75000"/>
+            </a:schemeClr>
+          </a:solidFill>
+        </p:spPr>
+        <p:txBody>
+          <a:bodyPr wrap="square" rtlCol="0">
+            <a:spAutoFit/>
+          </a:bodyPr>
+          <a:lstStyle/>
+          <a:p>
+            <a:pPr algn="ctr"/>
+            <a:r>
+              <a:rPr lang="fr-FR" dirty="0" smtClean="0">
+                <a:solidFill>
+                  <a:schemeClr val="bg1"/>
+                </a:solidFill>
+              </a:rPr>
+              <a:t>REST/</a:t>
+            </a:r>
+            <a:r>
+              <a:rPr lang="fr-FR" dirty="0" err="1" smtClean="0">
+                <a:solidFill>
+                  <a:schemeClr val="bg1"/>
+                </a:solidFill>
+              </a:rPr>
+              <a:t>Json</a:t>
+            </a:r>
+            <a:endParaRPr lang="fr-FR" dirty="0">
+              <a:solidFill>
+                <a:schemeClr val="bg1"/>
+              </a:solidFill>
+            </a:endParaRPr>
+          </a:p>
+        </p:txBody>
+      </p:sp>
+      <p:sp>
+        <p:nvSpPr>
+          <p:cNvPr id="20" name="ZoneTexte 19"/>
+          <p:cNvSpPr txBox="1"/>
+          <p:nvPr/>
+        </p:nvSpPr>
+        <p:spPr>
+          <a:xfrm>
+            <a:off x="1649239" y="3012612"/>
+            <a:ext cx="1490533" cy="307777"/>
+          </a:xfrm>
+          <a:prstGeom prst="rect">
+            <a:avLst/>
+          </a:prstGeom>
+          <a:solidFill>
+            <a:schemeClr val="accent5">
+              <a:lumMod val="75000"/>
+            </a:schemeClr>
+          </a:solidFill>
+          <a:ln>
+            <a:solidFill>
+              <a:schemeClr val="tx2"/>
+            </a:solidFill>
+          </a:ln>
+        </p:spPr>
+        <p:txBody>
+          <a:bodyPr wrap="square" rtlCol="0">
+            <a:spAutoFit/>
+          </a:bodyPr>
+          <a:lstStyle/>
+          <a:p>
+            <a:pPr algn="ctr"/>
+            <a:r>
+              <a:rPr lang="fr-FR" sz="1400" dirty="0" smtClean="0">
+                <a:solidFill>
+                  <a:schemeClr val="bg1"/>
+                </a:solidFill>
+              </a:rPr>
+              <a:t>JS</a:t>
+            </a:r>
+            <a:endParaRPr lang="fr-FR" sz="1400" dirty="0">
+              <a:solidFill>
+                <a:schemeClr val="bg1"/>
+              </a:solidFill>
+            </a:endParaRPr>
+          </a:p>
+        </p:txBody>
+      </p:sp>
+      <p:sp>
+        <p:nvSpPr>
+          <p:cNvPr id="25" name="Flèche droite 24"/>
+          <p:cNvSpPr/>
+          <p:nvPr/>
+        </p:nvSpPr>
+        <p:spPr>
+          <a:xfrm rot="10800000">
+            <a:off x="3218722" y="3037447"/>
+            <a:ext cx="2875947" cy="283896"/>
+          </a:xfrm>
+          <a:prstGeom prst="rightArrow">
+            <a:avLst/>
+          </a:prstGeom>
+          <a:solidFill>
+            <a:schemeClr val="accent2">
+              <a:lumMod val="60000"/>
+              <a:lumOff val="40000"/>
+            </a:schemeClr>
+          </a:solidFill>
+          <a:ln>
+            <a:noFill/>
+          </a:ln>
+        </p:spPr>
+        <p:style>
+          <a:lnRef idx="2">
+            <a:schemeClr val="accent1">
+              <a:shade val="50000"/>
+            </a:schemeClr>
+          </a:lnRef>
+          <a:fillRef idx="1">
+            <a:schemeClr val="accent1"/>
+          </a:fillRef>
+          <a:effectRef idx="0">
+            <a:schemeClr val="accent1"/>
+          </a:effectRef>
+          <a:fontRef idx="minor">
+            <a:schemeClr val="lt1"/>
+          </a:fontRef>
+        </p:style>
+        <p:txBody>
+          <a:bodyPr rtlCol="0" anchor="ctr"/>
+          <a:lstStyle/>
+          <a:p>
+            <a:pPr algn="ctr"/>
+            <a:endParaRPr lang="fr-FR"/>
+          </a:p>
+        </p:txBody>
+      </p:sp>
+      <p:sp>
+        <p:nvSpPr>
+          <p:cNvPr id="26" name="Flèche droite 25"/>
+          <p:cNvSpPr/>
+          <p:nvPr/>
+        </p:nvSpPr>
+        <p:spPr>
+          <a:xfrm>
+            <a:off x="4801334" y="3038132"/>
+            <a:ext cx="1811702" cy="283896"/>
+          </a:xfrm>
+          <a:prstGeom prst="rightArrow">
+            <a:avLst/>
+          </a:prstGeom>
+          <a:solidFill>
+            <a:schemeClr val="accent2">
+              <a:lumMod val="60000"/>
+              <a:lumOff val="40000"/>
+            </a:schemeClr>
+          </a:solidFill>
+          <a:ln>
+            <a:noFill/>
+          </a:ln>
+        </p:spPr>
+        <p:style>
+          <a:lnRef idx="2">
+            <a:schemeClr val="accent1">
+              <a:shade val="50000"/>
+            </a:schemeClr>
+          </a:lnRef>
+          <a:fillRef idx="1">
+            <a:schemeClr val="accent1"/>
+          </a:fillRef>
+          <a:effectRef idx="0">
+            <a:schemeClr val="accent1"/>
+          </a:effectRef>
+          <a:fontRef idx="minor">
+            <a:schemeClr val="lt1"/>
+          </a:fontRef>
+        </p:style>
+        <p:txBody>
+          <a:bodyPr rtlCol="0" anchor="ctr"/>
+          <a:lstStyle/>
+          <a:p>
+            <a:pPr algn="ctr"/>
+            <a:endParaRPr lang="fr-FR"/>
+          </a:p>
+        </p:txBody>
+      </p:sp>
+      <p:sp>
+        <p:nvSpPr>
+          <p:cNvPr id="27" name="Flèche droite 26"/>
+          <p:cNvSpPr/>
+          <p:nvPr/>
+        </p:nvSpPr>
+        <p:spPr>
+          <a:xfrm rot="16200000">
+            <a:off x="1312635" y="4273157"/>
+            <a:ext cx="2172154" cy="324899"/>
+          </a:xfrm>
+          <a:prstGeom prst="rightArrow">
+            <a:avLst/>
+          </a:prstGeom>
+          <a:solidFill>
+            <a:schemeClr val="accent2">
+              <a:lumMod val="60000"/>
+              <a:lumOff val="40000"/>
+            </a:schemeClr>
+          </a:solidFill>
+          <a:ln>
+            <a:noFill/>
+          </a:ln>
+        </p:spPr>
+        <p:style>
+          <a:lnRef idx="2">
+            <a:schemeClr val="accent1">
+              <a:shade val="50000"/>
+            </a:schemeClr>
+          </a:lnRef>
+          <a:fillRef idx="1">
+            <a:schemeClr val="accent1"/>
+          </a:fillRef>
+          <a:effectRef idx="0">
+            <a:schemeClr val="accent1"/>
+          </a:effectRef>
+          <a:fontRef idx="minor">
+            <a:schemeClr val="lt1"/>
+          </a:fontRef>
+        </p:style>
+        <p:txBody>
+          <a:bodyPr rtlCol="0" anchor="ctr"/>
+          <a:lstStyle/>
+          <a:p>
+            <a:pPr algn="ctr"/>
+            <a:endParaRPr lang="fr-FR"/>
+          </a:p>
+        </p:txBody>
+      </p:sp>
+      <p:sp>
+        <p:nvSpPr>
+          <p:cNvPr id="29" name="Flèche droite 28"/>
+          <p:cNvSpPr/>
+          <p:nvPr/>
+        </p:nvSpPr>
+        <p:spPr>
+          <a:xfrm rot="10800000">
+            <a:off x="8284307" y="3022713"/>
+            <a:ext cx="565527" cy="284578"/>
+          </a:xfrm>
+          <a:prstGeom prst="rightArrow">
+            <a:avLst/>
+          </a:prstGeom>
+          <a:solidFill>
+            <a:schemeClr val="accent2">
+              <a:lumMod val="60000"/>
+              <a:lumOff val="40000"/>
+            </a:schemeClr>
+          </a:solidFill>
+          <a:ln>
+            <a:noFill/>
+          </a:ln>
+        </p:spPr>
+        <p:style>
+          <a:lnRef idx="2">
+            <a:schemeClr val="accent1">
+              <a:shade val="50000"/>
+            </a:schemeClr>
+          </a:lnRef>
+          <a:fillRef idx="1">
+            <a:schemeClr val="accent1"/>
+          </a:fillRef>
+          <a:effectRef idx="0">
+            <a:schemeClr val="accent1"/>
+          </a:effectRef>
+          <a:fontRef idx="minor">
+            <a:schemeClr val="lt1"/>
+          </a:fontRef>
+        </p:style>
+        <p:txBody>
+          <a:bodyPr rtlCol="0" anchor="ctr"/>
+          <a:lstStyle/>
+          <a:p>
+            <a:pPr algn="ctr"/>
+            <a:endParaRPr lang="fr-FR"/>
+          </a:p>
+        </p:txBody>
+      </p:sp>
+      <p:sp>
+        <p:nvSpPr>
+          <p:cNvPr id="30" name="Flèche droite 29"/>
+          <p:cNvSpPr/>
+          <p:nvPr/>
+        </p:nvSpPr>
+        <p:spPr>
+          <a:xfrm>
+            <a:off x="8725036" y="3023331"/>
+            <a:ext cx="828699" cy="284578"/>
+          </a:xfrm>
+          <a:prstGeom prst="rightArrow">
+            <a:avLst/>
+          </a:prstGeom>
+          <a:solidFill>
+            <a:schemeClr val="accent2">
+              <a:lumMod val="60000"/>
+              <a:lumOff val="40000"/>
+            </a:schemeClr>
+          </a:solidFill>
+          <a:ln>
+            <a:noFill/>
+          </a:ln>
+        </p:spPr>
+        <p:style>
+          <a:lnRef idx="2">
+            <a:schemeClr val="accent1">
+              <a:shade val="50000"/>
+            </a:schemeClr>
+          </a:lnRef>
+          <a:fillRef idx="1">
+            <a:schemeClr val="accent1"/>
+          </a:fillRef>
+          <a:effectRef idx="0">
+            <a:schemeClr val="accent1"/>
+          </a:effectRef>
+          <a:fontRef idx="minor">
+            <a:schemeClr val="lt1"/>
+          </a:fontRef>
+        </p:style>
+        <p:txBody>
+          <a:bodyPr rtlCol="0" anchor="ctr"/>
+          <a:lstStyle/>
+          <a:p>
+            <a:pPr algn="ctr"/>
+            <a:endParaRPr lang="fr-FR"/>
+          </a:p>
+        </p:txBody>
+      </p:sp>
+      <p:sp>
+        <p:nvSpPr>
+          <p:cNvPr id="33" name="Rectangle à coins arrondis 32"/>
+          <p:cNvSpPr/>
+          <p:nvPr/>
+        </p:nvSpPr>
+        <p:spPr>
+          <a:xfrm>
+            <a:off x="4540296" y="3037446"/>
+            <a:ext cx="1414741" cy="283897"/>
+          </a:xfrm>
+          <a:prstGeom prst="roundRect">
+            <a:avLst/>
+          </a:prstGeom>
+          <a:solidFill>
+            <a:schemeClr val="accent2">
+              <a:lumMod val="60000"/>
+              <a:lumOff val="40000"/>
+            </a:schemeClr>
+          </a:solidFill>
+          <a:ln>
+            <a:solidFill>
+              <a:schemeClr val="accent2">
+                <a:lumMod val="75000"/>
+              </a:schemeClr>
+            </a:solidFill>
+          </a:ln>
+        </p:spPr>
+        <p:style>
+          <a:lnRef idx="2">
+            <a:schemeClr val="accent1">
+              <a:shade val="50000"/>
+            </a:schemeClr>
+          </a:lnRef>
+          <a:fillRef idx="1">
+            <a:schemeClr val="accent1"/>
+          </a:fillRef>
+          <a:effectRef idx="0">
+            <a:schemeClr val="accent1"/>
+          </a:effectRef>
+          <a:fontRef idx="minor">
+            <a:schemeClr val="lt1"/>
+          </a:fontRef>
+        </p:style>
+        <p:txBody>
+          <a:bodyPr rtlCol="0" anchor="ctr"/>
+          <a:lstStyle/>
+          <a:p>
+            <a:pPr algn="ctr"/>
+            <a:r>
+              <a:rPr lang="fr-FR" sz="1200" dirty="0" smtClean="0"/>
+              <a:t>Edit Data</a:t>
+            </a:r>
+            <a:endParaRPr lang="fr-FR" sz="1200" dirty="0"/>
+          </a:p>
+        </p:txBody>
+      </p:sp>
+      <p:sp>
+        <p:nvSpPr>
+          <p:cNvPr id="37" name="Rectangle à coins arrondis 36"/>
+          <p:cNvSpPr/>
+          <p:nvPr/>
+        </p:nvSpPr>
+        <p:spPr>
+          <a:xfrm>
+            <a:off x="8609468" y="3023393"/>
+            <a:ext cx="688063" cy="283897"/>
+          </a:xfrm>
+          <a:prstGeom prst="roundRect">
+            <a:avLst/>
+          </a:prstGeom>
+          <a:solidFill>
+            <a:schemeClr val="accent2">
+              <a:lumMod val="60000"/>
+              <a:lumOff val="40000"/>
+            </a:schemeClr>
+          </a:solidFill>
+          <a:ln>
+            <a:solidFill>
+              <a:schemeClr val="accent2">
+                <a:lumMod val="75000"/>
+              </a:schemeClr>
+            </a:solidFill>
+          </a:ln>
+        </p:spPr>
+        <p:style>
+          <a:lnRef idx="2">
+            <a:schemeClr val="accent1">
+              <a:shade val="50000"/>
+            </a:schemeClr>
+          </a:lnRef>
+          <a:fillRef idx="1">
+            <a:schemeClr val="accent1"/>
+          </a:fillRef>
+          <a:effectRef idx="0">
+            <a:schemeClr val="accent1"/>
+          </a:effectRef>
+          <a:fontRef idx="minor">
+            <a:schemeClr val="lt1"/>
+          </a:fontRef>
+        </p:style>
+        <p:txBody>
+          <a:bodyPr rtlCol="0" anchor="ctr"/>
+          <a:lstStyle/>
+          <a:p>
+            <a:pPr algn="ctr"/>
+            <a:r>
+              <a:rPr lang="fr-FR" sz="1200" dirty="0" smtClean="0"/>
+              <a:t>Update</a:t>
+            </a:r>
+            <a:endParaRPr lang="fr-FR" sz="1200" dirty="0"/>
+          </a:p>
+        </p:txBody>
+      </p:sp>
+      <p:sp>
+        <p:nvSpPr>
+          <p:cNvPr id="43" name="ZoneTexte 42"/>
+          <p:cNvSpPr txBox="1"/>
+          <p:nvPr/>
+        </p:nvSpPr>
+        <p:spPr>
+          <a:xfrm>
+            <a:off x="6240165" y="803719"/>
+            <a:ext cx="4559640" cy="369332"/>
+          </a:xfrm>
+          <a:prstGeom prst="rect">
+            <a:avLst/>
+          </a:prstGeom>
+          <a:solidFill>
+            <a:schemeClr val="accent6">
+              <a:lumMod val="40000"/>
+              <a:lumOff val="60000"/>
+            </a:schemeClr>
+          </a:solidFill>
+          <a:ln w="12700">
+            <a:solidFill>
+              <a:schemeClr val="tx2"/>
+            </a:solidFill>
+          </a:ln>
+        </p:spPr>
+        <p:txBody>
+          <a:bodyPr wrap="square" rtlCol="0">
+            <a:spAutoFit/>
+          </a:bodyPr>
+          <a:lstStyle/>
+          <a:p>
+            <a:pPr algn="ctr"/>
+            <a:r>
+              <a:rPr lang="fr-FR" dirty="0" smtClean="0"/>
+              <a:t>Server</a:t>
+            </a:r>
+          </a:p>
+        </p:txBody>
+      </p:sp>
+      <p:sp>
+        <p:nvSpPr>
+          <p:cNvPr id="47" name="Rectangle 46"/>
+          <p:cNvSpPr/>
+          <p:nvPr/>
+        </p:nvSpPr>
+        <p:spPr>
+          <a:xfrm>
+            <a:off x="6773598" y="1250055"/>
+            <a:ext cx="1482811" cy="790834"/>
+          </a:xfrm>
+          <a:prstGeom prst="rect">
+            <a:avLst/>
+          </a:prstGeom>
+        </p:spPr>
+        <p:style>
+          <a:lnRef idx="2">
+            <a:schemeClr val="accent1">
+              <a:shade val="50000"/>
+            </a:schemeClr>
+          </a:lnRef>
+          <a:fillRef idx="1">
+            <a:schemeClr val="accent1"/>
+          </a:fillRef>
+          <a:effectRef idx="0">
+            <a:schemeClr val="accent1"/>
+          </a:effectRef>
+          <a:fontRef idx="minor">
+            <a:schemeClr val="lt1"/>
+          </a:fontRef>
+        </p:style>
+        <p:txBody>
+          <a:bodyPr rtlCol="0" anchor="ctr"/>
+          <a:lstStyle/>
+          <a:p>
+            <a:pPr algn="ctr"/>
+            <a:r>
+              <a:rPr lang="fr-FR" dirty="0" smtClean="0"/>
+              <a:t>Server App</a:t>
+            </a:r>
+            <a:endParaRPr lang="fr-FR" dirty="0"/>
+          </a:p>
+        </p:txBody>
+      </p:sp>
+      <p:sp>
+        <p:nvSpPr>
+          <p:cNvPr id="15" name="ZoneTexte 14"/>
+          <p:cNvSpPr txBox="1"/>
+          <p:nvPr/>
+        </p:nvSpPr>
+        <p:spPr>
+          <a:xfrm>
+            <a:off x="6762952" y="1927394"/>
+            <a:ext cx="1493458" cy="369332"/>
+          </a:xfrm>
+          <a:prstGeom prst="rect">
+            <a:avLst/>
+          </a:prstGeom>
+          <a:solidFill>
+            <a:schemeClr val="accent5">
+              <a:lumMod val="75000"/>
+            </a:schemeClr>
+          </a:solidFill>
+          <a:ln w="6350">
+            <a:solidFill>
+              <a:schemeClr val="tx2"/>
+            </a:solidFill>
+          </a:ln>
+        </p:spPr>
+        <p:txBody>
+          <a:bodyPr wrap="square" rtlCol="0">
+            <a:spAutoFit/>
+          </a:bodyPr>
+          <a:lstStyle/>
+          <a:p>
+            <a:pPr algn="ctr"/>
+            <a:r>
+              <a:rPr lang="fr-FR" dirty="0" err="1" smtClean="0">
+                <a:solidFill>
+                  <a:schemeClr val="bg1"/>
+                </a:solidFill>
+              </a:rPr>
+              <a:t>Node</a:t>
+            </a:r>
+            <a:r>
+              <a:rPr lang="fr-FR" dirty="0">
+                <a:solidFill>
+                  <a:schemeClr val="bg1"/>
+                </a:solidFill>
+              </a:rPr>
+              <a:t> </a:t>
+            </a:r>
+            <a:r>
+              <a:rPr lang="fr-FR" dirty="0" smtClean="0">
+                <a:solidFill>
+                  <a:schemeClr val="bg1"/>
+                </a:solidFill>
+              </a:rPr>
+              <a:t>JS</a:t>
+            </a:r>
+            <a:endParaRPr lang="fr-FR" dirty="0">
+              <a:solidFill>
+                <a:schemeClr val="bg1"/>
+              </a:solidFill>
+            </a:endParaRPr>
+          </a:p>
+        </p:txBody>
+      </p:sp>
+      <p:sp>
+        <p:nvSpPr>
+          <p:cNvPr id="2" name="Rectangle 1"/>
+          <p:cNvSpPr/>
+          <p:nvPr/>
+        </p:nvSpPr>
+        <p:spPr>
+          <a:xfrm>
+            <a:off x="2834197" y="5341019"/>
+            <a:ext cx="4667245" cy="180665"/>
+          </a:xfrm>
+          <a:prstGeom prst="rect">
+            <a:avLst/>
+          </a:prstGeom>
+          <a:solidFill>
+            <a:schemeClr val="accent2">
+              <a:lumMod val="60000"/>
+              <a:lumOff val="40000"/>
+            </a:schemeClr>
+          </a:solidFill>
+          <a:ln>
+            <a:noFill/>
+          </a:ln>
+        </p:spPr>
+        <p:style>
+          <a:lnRef idx="2">
+            <a:schemeClr val="accent1">
+              <a:shade val="50000"/>
+            </a:schemeClr>
+          </a:lnRef>
+          <a:fillRef idx="1">
+            <a:schemeClr val="accent1"/>
+          </a:fillRef>
+          <a:effectRef idx="0">
+            <a:schemeClr val="accent1"/>
+          </a:effectRef>
+          <a:fontRef idx="minor">
+            <a:schemeClr val="lt1"/>
+          </a:fontRef>
+        </p:style>
+        <p:txBody>
+          <a:bodyPr rtlCol="0" anchor="ctr"/>
+          <a:lstStyle/>
+          <a:p>
+            <a:pPr algn="ctr"/>
+            <a:r>
+              <a:rPr lang="fr-FR" dirty="0" smtClean="0"/>
+              <a:t>v</a:t>
+            </a:r>
+            <a:endParaRPr lang="fr-FR" dirty="0"/>
+          </a:p>
+        </p:txBody>
+      </p:sp>
+      <p:sp>
+        <p:nvSpPr>
+          <p:cNvPr id="34" name="Rectangle à coins arrondis 33"/>
+          <p:cNvSpPr/>
+          <p:nvPr/>
+        </p:nvSpPr>
+        <p:spPr>
+          <a:xfrm>
+            <a:off x="4519484" y="5280702"/>
+            <a:ext cx="1414741" cy="283897"/>
+          </a:xfrm>
+          <a:prstGeom prst="roundRect">
+            <a:avLst/>
+          </a:prstGeom>
+          <a:solidFill>
+            <a:schemeClr val="accent2">
+              <a:lumMod val="60000"/>
+              <a:lumOff val="40000"/>
+            </a:schemeClr>
+          </a:solidFill>
+          <a:ln>
+            <a:solidFill>
+              <a:schemeClr val="accent2">
+                <a:lumMod val="75000"/>
+              </a:schemeClr>
+            </a:solidFill>
+          </a:ln>
+        </p:spPr>
+        <p:style>
+          <a:lnRef idx="2">
+            <a:schemeClr val="accent1">
+              <a:shade val="50000"/>
+            </a:schemeClr>
+          </a:lnRef>
+          <a:fillRef idx="1">
+            <a:schemeClr val="accent1"/>
+          </a:fillRef>
+          <a:effectRef idx="0">
+            <a:schemeClr val="accent1"/>
+          </a:effectRef>
+          <a:fontRef idx="minor">
+            <a:schemeClr val="lt1"/>
+          </a:fontRef>
+        </p:style>
+        <p:txBody>
+          <a:bodyPr rtlCol="0" anchor="ctr"/>
+          <a:lstStyle/>
+          <a:p>
+            <a:pPr algn="ctr"/>
+            <a:r>
+              <a:rPr lang="fr-FR" sz="1200" dirty="0" smtClean="0"/>
+              <a:t>Data </a:t>
+            </a:r>
+            <a:r>
+              <a:rPr lang="fr-FR" sz="1200" dirty="0" err="1" smtClean="0"/>
+              <a:t>rendering</a:t>
+            </a:r>
+            <a:endParaRPr lang="fr-FR" sz="1200" dirty="0"/>
+          </a:p>
+        </p:txBody>
+      </p:sp>
+      <p:sp>
+        <p:nvSpPr>
+          <p:cNvPr id="18" name="ZoneTexte 17"/>
+          <p:cNvSpPr txBox="1"/>
+          <p:nvPr/>
+        </p:nvSpPr>
+        <p:spPr>
+          <a:xfrm>
+            <a:off x="1806529" y="5239906"/>
+            <a:ext cx="1175952" cy="369332"/>
+          </a:xfrm>
+          <a:prstGeom prst="rect">
+            <a:avLst/>
+          </a:prstGeom>
+          <a:solidFill>
+            <a:schemeClr val="accent5">
+              <a:lumMod val="75000"/>
+            </a:schemeClr>
+          </a:solidFill>
+        </p:spPr>
+        <p:txBody>
+          <a:bodyPr wrap="square" rtlCol="0">
+            <a:spAutoFit/>
+          </a:bodyPr>
+          <a:lstStyle/>
+          <a:p>
+            <a:pPr algn="ctr"/>
+            <a:r>
+              <a:rPr lang="fr-FR" dirty="0" smtClean="0">
+                <a:solidFill>
+                  <a:schemeClr val="bg1"/>
+                </a:solidFill>
+              </a:rPr>
+              <a:t>Angular2</a:t>
+            </a:r>
+            <a:endParaRPr lang="fr-FR" dirty="0">
+              <a:solidFill>
+                <a:schemeClr val="bg1"/>
+              </a:solidFill>
+            </a:endParaRPr>
+          </a:p>
+        </p:txBody>
+      </p:sp>
+    </p:spTree>
+    <p:extLst>
+      <p:ext uri="{BB962C8B-B14F-4D97-AF65-F5344CB8AC3E}">
+        <p14:creationId xmlns:p14="http://schemas.microsoft.com/office/powerpoint/2010/main" val="3749808524"/>
       </p:ext>
     </p:extLst>
   </p:cSld>

</xml_diff>